<commit_message>
Update libraries in slide presentation
</commit_message>
<xml_diff>
--- a/Presentation.pptx
+++ b/Presentation.pptx
@@ -215,7 +215,7 @@
           <a:p>
             <a:fld id="{82713B94-02AB-E44F-97CC-3AAF7A632819}" type="datetimeFigureOut">
               <a:rPr lang="it-IT" smtClean="0"/>
-              <a:t>19/12/19</a:t>
+              <a:t>20/12/19</a:t>
             </a:fld>
             <a:endParaRPr lang="it-IT"/>
           </a:p>
@@ -5895,7 +5895,7 @@
           <a:p>
             <a:fld id="{B96E2279-029F-964F-A5B1-8676BDA67CCA}" type="datetimeFigureOut">
               <a:rPr lang="it-IT" smtClean="0"/>
-              <a:t>19/12/19</a:t>
+              <a:t>20/12/19</a:t>
             </a:fld>
             <a:endParaRPr lang="it-IT"/>
           </a:p>
@@ -6109,7 +6109,7 @@
           <a:p>
             <a:fld id="{B96E2279-029F-964F-A5B1-8676BDA67CCA}" type="datetimeFigureOut">
               <a:rPr lang="it-IT" smtClean="0"/>
-              <a:t>19/12/19</a:t>
+              <a:t>20/12/19</a:t>
             </a:fld>
             <a:endParaRPr lang="it-IT"/>
           </a:p>
@@ -11110,7 +11110,7 @@
           <a:p>
             <a:fld id="{B96E2279-029F-964F-A5B1-8676BDA67CCA}" type="datetimeFigureOut">
               <a:rPr lang="it-IT" smtClean="0"/>
-              <a:t>19/12/19</a:t>
+              <a:t>20/12/19</a:t>
             </a:fld>
             <a:endParaRPr lang="it-IT"/>
           </a:p>
@@ -11431,7 +11431,7 @@
           <a:p>
             <a:fld id="{B96E2279-029F-964F-A5B1-8676BDA67CCA}" type="datetimeFigureOut">
               <a:rPr lang="it-IT" smtClean="0"/>
-              <a:t>19/12/19</a:t>
+              <a:t>20/12/19</a:t>
             </a:fld>
             <a:endParaRPr lang="it-IT"/>
           </a:p>
@@ -11886,7 +11886,7 @@
           <a:p>
             <a:fld id="{B96E2279-029F-964F-A5B1-8676BDA67CCA}" type="datetimeFigureOut">
               <a:rPr lang="it-IT" smtClean="0"/>
-              <a:t>19/12/19</a:t>
+              <a:t>20/12/19</a:t>
             </a:fld>
             <a:endParaRPr lang="it-IT"/>
           </a:p>
@@ -12039,7 +12039,7 @@
           <a:p>
             <a:fld id="{B96E2279-029F-964F-A5B1-8676BDA67CCA}" type="datetimeFigureOut">
               <a:rPr lang="it-IT" smtClean="0"/>
-              <a:t>19/12/19</a:t>
+              <a:t>20/12/19</a:t>
             </a:fld>
             <a:endParaRPr lang="it-IT"/>
           </a:p>
@@ -12170,7 +12170,7 @@
           <a:p>
             <a:fld id="{B96E2279-029F-964F-A5B1-8676BDA67CCA}" type="datetimeFigureOut">
               <a:rPr lang="it-IT" smtClean="0"/>
-              <a:t>19/12/19</a:t>
+              <a:t>20/12/19</a:t>
             </a:fld>
             <a:endParaRPr lang="it-IT"/>
           </a:p>
@@ -12481,7 +12481,7 @@
           <a:p>
             <a:fld id="{B96E2279-029F-964F-A5B1-8676BDA67CCA}" type="datetimeFigureOut">
               <a:rPr lang="it-IT" smtClean="0"/>
-              <a:t>19/12/19</a:t>
+              <a:t>20/12/19</a:t>
             </a:fld>
             <a:endParaRPr lang="it-IT"/>
           </a:p>
@@ -12772,7 +12772,7 @@
           <a:p>
             <a:fld id="{B96E2279-029F-964F-A5B1-8676BDA67CCA}" type="datetimeFigureOut">
               <a:rPr lang="it-IT" smtClean="0"/>
-              <a:t>19/12/19</a:t>
+              <a:t>20/12/19</a:t>
             </a:fld>
             <a:endParaRPr lang="it-IT"/>
           </a:p>
@@ -18090,13 +18090,13 @@
           <p:nvPr>
             <p:extLst>
               <p:ext uri="{D42A27DB-BD31-4B8C-83A1-F6EECF244321}">
-                <p14:modId xmlns:p14="http://schemas.microsoft.com/office/powerpoint/2010/main" val="1731087273"/>
+                <p14:modId xmlns:p14="http://schemas.microsoft.com/office/powerpoint/2010/main" val="1808160162"/>
               </p:ext>
             </p:extLst>
           </p:nvPr>
         </p:nvGraphicFramePr>
         <p:xfrm>
-          <a:off x="437841" y="2083231"/>
+          <a:off x="430799" y="1384121"/>
           <a:ext cx="8282401" cy="3324480"/>
         </p:xfrm>
         <a:graphic>
@@ -18359,7 +18359,7 @@
                         <a:defRPr/>
                       </a:pPr>
                       <a:r>
-                        <a:rPr lang="it-IT" sz="2000" kern="1200" dirty="0">
+                        <a:rPr lang="it-IT" sz="2000" kern="1200" dirty="0" err="1">
                           <a:solidFill>
                             <a:schemeClr val="dk1"/>
                           </a:solidFill>
@@ -18367,38 +18367,16 @@
                           <a:ea typeface="+mn-ea"/>
                           <a:cs typeface="+mn-cs"/>
                         </a:rPr>
-                        <a:t>Magenta/</a:t>
+                        <a:t>Magenta.js</a:t>
                       </a:r>
-                    </a:p>
-                    <a:p>
-                      <a:pPr marL="0" marR="0" lvl="0" indent="0" algn="l" defTabSz="457200" rtl="0" eaLnBrk="1" fontAlgn="auto" latinLnBrk="0" hangingPunct="1">
-                        <a:lnSpc>
-                          <a:spcPct val="100000"/>
-                        </a:lnSpc>
-                        <a:spcBef>
-                          <a:spcPts val="0"/>
-                        </a:spcBef>
-                        <a:spcAft>
-                          <a:spcPts val="0"/>
-                        </a:spcAft>
-                        <a:buClrTx/>
-                        <a:buSzTx/>
-                        <a:buFontTx/>
-                        <a:buNone/>
-                        <a:tabLst/>
-                        <a:defRPr/>
-                      </a:pPr>
-                      <a:r>
-                        <a:rPr lang="it-IT" sz="2000" kern="1200" dirty="0">
-                          <a:solidFill>
-                            <a:schemeClr val="dk1"/>
-                          </a:solidFill>
-                          <a:latin typeface="Century Schoolbook" panose="02040604050505020304" pitchFamily="18" charset="0"/>
-                          <a:ea typeface="+mn-ea"/>
-                          <a:cs typeface="+mn-cs"/>
-                        </a:rPr>
-                        <a:t>sketch</a:t>
-                      </a:r>
+                      <a:endParaRPr lang="it-IT" sz="2000" kern="1200" dirty="0">
+                        <a:solidFill>
+                          <a:schemeClr val="dk1"/>
+                        </a:solidFill>
+                        <a:latin typeface="Century Schoolbook" panose="02040604050505020304" pitchFamily="18" charset="0"/>
+                        <a:ea typeface="+mn-ea"/>
+                        <a:cs typeface="+mn-cs"/>
+                      </a:endParaRPr>
                     </a:p>
                   </a:txBody>
                   <a:tcPr marL="103270" marR="103270" marT="51635" marB="51635" anchor="ctr"/>
@@ -18427,17 +18405,20 @@
                         <a:rPr lang="it-IT" sz="2000" dirty="0">
                           <a:latin typeface="Century Schoolbook" panose="02040604050505020304" pitchFamily="18" charset="0"/>
                         </a:rPr>
-                        <a:t>RNN model to </a:t>
+                        <a:t>Machine </a:t>
                       </a:r>
                       <a:r>
                         <a:rPr lang="it-IT" sz="2000" dirty="0" err="1">
                           <a:latin typeface="Century Schoolbook" panose="02040604050505020304" pitchFamily="18" charset="0"/>
                         </a:rPr>
-                        <a:t>draw</a:t>
+                        <a:t>learning</a:t>
                       </a:r>
-                      <a:endParaRPr lang="it-IT" sz="2000" dirty="0">
-                        <a:latin typeface="Century Schoolbook" panose="02040604050505020304" pitchFamily="18" charset="0"/>
-                      </a:endParaRPr>
+                      <a:r>
+                        <a:rPr lang="it-IT" sz="2000" dirty="0">
+                          <a:latin typeface="Century Schoolbook" panose="02040604050505020304" pitchFamily="18" charset="0"/>
+                        </a:rPr>
+                        <a:t> API</a:t>
+                      </a:r>
                     </a:p>
                   </a:txBody>
                   <a:tcPr marL="103270" marR="103270" marT="51635" marB="51635" anchor="ctr"/>
@@ -18570,6 +18551,278 @@
                 <a:extLst>
                   <a:ext uri="{0D108BD9-81ED-4DB2-BD59-A6C34878D82A}">
                     <a16:rowId xmlns:a16="http://schemas.microsoft.com/office/drawing/2014/main" val="3703329354"/>
+                  </a:ext>
+                </a:extLst>
+              </a:tr>
+            </a:tbl>
+          </a:graphicData>
+        </a:graphic>
+      </p:graphicFrame>
+      <p:graphicFrame>
+        <p:nvGraphicFramePr>
+          <p:cNvPr id="15" name="Table 14">
+            <a:extLst>
+              <a:ext uri="{FF2B5EF4-FFF2-40B4-BE49-F238E27FC236}">
+                <a16:creationId xmlns:a16="http://schemas.microsoft.com/office/drawing/2014/main" id="{70E43798-4A2A-1543-8F6A-91B8DEF6CB89}"/>
+              </a:ext>
+            </a:extLst>
+          </p:cNvPr>
+          <p:cNvGraphicFramePr>
+            <a:graphicFrameLocks noGrp="1"/>
+          </p:cNvGraphicFramePr>
+          <p:nvPr>
+            <p:extLst>
+              <p:ext uri="{D42A27DB-BD31-4B8C-83A1-F6EECF244321}">
+                <p14:modId xmlns:p14="http://schemas.microsoft.com/office/powerpoint/2010/main" val="4005505232"/>
+              </p:ext>
+            </p:extLst>
+          </p:nvPr>
+        </p:nvGraphicFramePr>
+        <p:xfrm>
+          <a:off x="437841" y="4887150"/>
+          <a:ext cx="8282401" cy="1303510"/>
+        </p:xfrm>
+        <a:graphic>
+          <a:graphicData uri="http://schemas.openxmlformats.org/drawingml/2006/table">
+            <a:tbl>
+              <a:tblPr firstRow="1" bandRow="1">
+                <a:tableStyleId>{5C22544A-7EE6-4342-B048-85BDC9FD1C3A}</a:tableStyleId>
+              </a:tblPr>
+              <a:tblGrid>
+                <a:gridCol w="1903393">
+                  <a:extLst>
+                    <a:ext uri="{9D8B030D-6E8A-4147-A177-3AD203B41FA5}">
+                      <a16:colId xmlns:a16="http://schemas.microsoft.com/office/drawing/2014/main" val="3542591440"/>
+                    </a:ext>
+                  </a:extLst>
+                </a:gridCol>
+                <a:gridCol w="1849766">
+                  <a:extLst>
+                    <a:ext uri="{9D8B030D-6E8A-4147-A177-3AD203B41FA5}">
+                      <a16:colId xmlns:a16="http://schemas.microsoft.com/office/drawing/2014/main" val="1200809420"/>
+                    </a:ext>
+                  </a:extLst>
+                </a:gridCol>
+                <a:gridCol w="2781300">
+                  <a:extLst>
+                    <a:ext uri="{9D8B030D-6E8A-4147-A177-3AD203B41FA5}">
+                      <a16:colId xmlns:a16="http://schemas.microsoft.com/office/drawing/2014/main" val="3864845586"/>
+                    </a:ext>
+                  </a:extLst>
+                </a:gridCol>
+                <a:gridCol w="1747942">
+                  <a:extLst>
+                    <a:ext uri="{9D8B030D-6E8A-4147-A177-3AD203B41FA5}">
+                      <a16:colId xmlns:a16="http://schemas.microsoft.com/office/drawing/2014/main" val="1064784907"/>
+                    </a:ext>
+                  </a:extLst>
+                </a:gridCol>
+              </a:tblGrid>
+              <a:tr h="651600">
+                <a:tc>
+                  <a:txBody>
+                    <a:bodyPr/>
+                    <a:lstStyle/>
+                    <a:p>
+                      <a:pPr algn="ctr"/>
+                      <a:r>
+                        <a:rPr lang="it-IT" sz="1800" dirty="0">
+                          <a:latin typeface="Century Schoolbook" panose="02040604050505020304" pitchFamily="18" charset="0"/>
+                        </a:rPr>
+                        <a:t>NN model</a:t>
+                      </a:r>
+                    </a:p>
+                  </a:txBody>
+                  <a:tcPr marL="103270" marR="103270" marT="51635" marB="51635" anchor="ctr"/>
+                </a:tc>
+                <a:tc>
+                  <a:txBody>
+                    <a:bodyPr/>
+                    <a:lstStyle/>
+                    <a:p>
+                      <a:pPr algn="ctr"/>
+                      <a:r>
+                        <a:rPr lang="it-IT" sz="1800" dirty="0">
+                          <a:latin typeface="Century Schoolbook" panose="02040604050505020304" pitchFamily="18" charset="0"/>
+                        </a:rPr>
+                        <a:t>Author</a:t>
+                      </a:r>
+                    </a:p>
+                  </a:txBody>
+                  <a:tcPr marL="103270" marR="103270" marT="51635" marB="51635" anchor="ctr"/>
+                </a:tc>
+                <a:tc>
+                  <a:txBody>
+                    <a:bodyPr/>
+                    <a:lstStyle/>
+                    <a:p>
+                      <a:pPr algn="ctr"/>
+                      <a:r>
+                        <a:rPr lang="it-IT" sz="1800" dirty="0" err="1">
+                          <a:latin typeface="Century Schoolbook" panose="02040604050505020304" pitchFamily="18" charset="0"/>
+                        </a:rPr>
+                        <a:t>Our</a:t>
+                      </a:r>
+                      <a:r>
+                        <a:rPr lang="it-IT" sz="1800" dirty="0">
+                          <a:latin typeface="Century Schoolbook" panose="02040604050505020304" pitchFamily="18" charset="0"/>
+                        </a:rPr>
+                        <a:t> </a:t>
+                      </a:r>
+                      <a:r>
+                        <a:rPr lang="it-IT" sz="1800" dirty="0" err="1">
+                          <a:latin typeface="Century Schoolbook" panose="02040604050505020304" pitchFamily="18" charset="0"/>
+                        </a:rPr>
+                        <a:t>usage</a:t>
+                      </a:r>
+                      <a:endParaRPr lang="it-IT" sz="1800" dirty="0">
+                        <a:latin typeface="Century Schoolbook" panose="02040604050505020304" pitchFamily="18" charset="0"/>
+                      </a:endParaRPr>
+                    </a:p>
+                  </a:txBody>
+                  <a:tcPr marL="103270" marR="103270" marT="51635" marB="51635" anchor="ctr"/>
+                </a:tc>
+                <a:tc>
+                  <a:txBody>
+                    <a:bodyPr/>
+                    <a:lstStyle/>
+                    <a:p>
+                      <a:pPr algn="ctr"/>
+                      <a:r>
+                        <a:rPr lang="it-IT" sz="1800" dirty="0">
+                          <a:latin typeface="Century Schoolbook" panose="02040604050505020304" pitchFamily="18" charset="0"/>
+                        </a:rPr>
+                        <a:t>License</a:t>
+                      </a:r>
+                    </a:p>
+                  </a:txBody>
+                  <a:tcPr marL="103270" marR="103270" marT="51635" marB="51635" anchor="ctr"/>
+                </a:tc>
+                <a:extLst>
+                  <a:ext uri="{0D108BD9-81ED-4DB2-BD59-A6C34878D82A}">
+                    <a16:rowId xmlns:a16="http://schemas.microsoft.com/office/drawing/2014/main" val="2909984160"/>
+                  </a:ext>
+                </a:extLst>
+              </a:tr>
+              <a:tr h="651600">
+                <a:tc>
+                  <a:txBody>
+                    <a:bodyPr/>
+                    <a:lstStyle/>
+                    <a:p>
+                      <a:pPr marL="0" marR="0" lvl="0" indent="0" algn="l" defTabSz="457200" rtl="0" eaLnBrk="1" fontAlgn="auto" latinLnBrk="0" hangingPunct="1">
+                        <a:lnSpc>
+                          <a:spcPct val="100000"/>
+                        </a:lnSpc>
+                        <a:spcBef>
+                          <a:spcPts val="0"/>
+                        </a:spcBef>
+                        <a:spcAft>
+                          <a:spcPts val="0"/>
+                        </a:spcAft>
+                        <a:buClrTx/>
+                        <a:buSzTx/>
+                        <a:buFontTx/>
+                        <a:buNone/>
+                        <a:tabLst/>
+                        <a:defRPr/>
+                      </a:pPr>
+                      <a:r>
+                        <a:rPr lang="it-IT" sz="1800" kern="1200" dirty="0">
+                          <a:solidFill>
+                            <a:schemeClr val="dk1"/>
+                          </a:solidFill>
+                          <a:latin typeface="Century Schoolbook" panose="02040604050505020304" pitchFamily="18" charset="0"/>
+                          <a:ea typeface="+mn-ea"/>
+                          <a:cs typeface="+mn-cs"/>
+                        </a:rPr>
+                        <a:t>Sketch-</a:t>
+                      </a:r>
+                      <a:r>
+                        <a:rPr lang="it-IT" sz="1800" kern="1200" dirty="0" err="1">
+                          <a:solidFill>
+                            <a:schemeClr val="dk1"/>
+                          </a:solidFill>
+                          <a:latin typeface="Century Schoolbook" panose="02040604050505020304" pitchFamily="18" charset="0"/>
+                          <a:ea typeface="+mn-ea"/>
+                          <a:cs typeface="+mn-cs"/>
+                        </a:rPr>
+                        <a:t>rnn</a:t>
+                      </a:r>
+                      <a:endParaRPr lang="it-IT" sz="1800" kern="1200" dirty="0">
+                        <a:solidFill>
+                          <a:schemeClr val="dk1"/>
+                        </a:solidFill>
+                        <a:latin typeface="Century Schoolbook" panose="02040604050505020304" pitchFamily="18" charset="0"/>
+                        <a:ea typeface="+mn-ea"/>
+                        <a:cs typeface="+mn-cs"/>
+                      </a:endParaRPr>
+                    </a:p>
+                  </a:txBody>
+                  <a:tcPr marL="103270" marR="103270" marT="51635" marB="51635" anchor="ctr"/>
+                </a:tc>
+                <a:tc>
+                  <a:txBody>
+                    <a:bodyPr/>
+                    <a:lstStyle/>
+                    <a:p>
+                      <a:r>
+                        <a:rPr lang="it-IT" sz="1800" dirty="0">
+                          <a:latin typeface="Century Schoolbook" panose="02040604050505020304" pitchFamily="18" charset="0"/>
+                        </a:rPr>
+                        <a:t>Open community</a:t>
+                      </a:r>
+                    </a:p>
+                  </a:txBody>
+                  <a:tcPr marL="103270" marR="103270" marT="51635" marB="51635" anchor="ctr"/>
+                </a:tc>
+                <a:tc>
+                  <a:txBody>
+                    <a:bodyPr/>
+                    <a:lstStyle/>
+                    <a:p>
+                      <a:r>
+                        <a:rPr lang="it-IT" sz="1800" dirty="0">
+                          <a:latin typeface="Century Schoolbook" panose="02040604050505020304" pitchFamily="18" charset="0"/>
+                        </a:rPr>
+                        <a:t>RNN model to </a:t>
+                      </a:r>
+                      <a:r>
+                        <a:rPr lang="it-IT" sz="1800" dirty="0" err="1">
+                          <a:latin typeface="Century Schoolbook" panose="02040604050505020304" pitchFamily="18" charset="0"/>
+                        </a:rPr>
+                        <a:t>draw</a:t>
+                      </a:r>
+                      <a:endParaRPr lang="it-IT" sz="1800" dirty="0">
+                        <a:latin typeface="Century Schoolbook" panose="02040604050505020304" pitchFamily="18" charset="0"/>
+                      </a:endParaRPr>
+                    </a:p>
+                  </a:txBody>
+                  <a:tcPr marL="103270" marR="103270" marT="51635" marB="51635" anchor="ctr"/>
+                </a:tc>
+                <a:tc>
+                  <a:txBody>
+                    <a:bodyPr/>
+                    <a:lstStyle/>
+                    <a:p>
+                      <a:r>
+                        <a:rPr lang="it-IT" sz="1800" kern="1200" dirty="0">
+                          <a:solidFill>
+                            <a:schemeClr val="dk1"/>
+                          </a:solidFill>
+                          <a:latin typeface="Century Schoolbook" panose="02040604050505020304" pitchFamily="18" charset="0"/>
+                          <a:ea typeface="+mn-ea"/>
+                          <a:cs typeface="+mn-cs"/>
+                        </a:rPr>
+                        <a:t>Apache License 2.0</a:t>
+                      </a:r>
+                    </a:p>
+                  </a:txBody>
+                  <a:tcPr marL="103270" marR="103270" marT="51635" marB="51635" anchor="ctr"/>
+                </a:tc>
+                <a:extLst>
+                  <a:ext uri="{0D108BD9-81ED-4DB2-BD59-A6C34878D82A}">
+                    <a16:rowId xmlns:a16="http://schemas.microsoft.com/office/drawing/2014/main" val="2219477671"/>
                   </a:ext>
                 </a:extLst>
               </a:tr>

</xml_diff>

<commit_message>
Update slide: bold words
</commit_message>
<xml_diff>
--- a/Presentation.pptx
+++ b/Presentation.pptx
@@ -19389,7 +19389,13 @@
               <a:rPr lang="en-GB" sz="2800" dirty="0">
                 <a:latin typeface="Century Schoolbook" panose="02040604050505020304" pitchFamily="18" charset="0"/>
               </a:rPr>
-              <a:t>Choose different story-scenarios</a:t>
+              <a:t>Choose different </a:t>
+            </a:r>
+            <a:r>
+              <a:rPr lang="en-GB" sz="2800" b="1" dirty="0">
+                <a:latin typeface="Century Schoolbook" panose="02040604050505020304" pitchFamily="18" charset="0"/>
+              </a:rPr>
+              <a:t>story-scenarios</a:t>
             </a:r>
           </a:p>
           <a:p>
@@ -19405,7 +19411,19 @@
               <a:rPr lang="en-GB" sz="2800" dirty="0">
                 <a:latin typeface="Century Schoolbook" panose="02040604050505020304" pitchFamily="18" charset="0"/>
               </a:rPr>
-              <a:t>Explore them in original and detailed ways</a:t>
+              <a:t>Explore them in </a:t>
+            </a:r>
+            <a:r>
+              <a:rPr lang="en-GB" sz="2800" b="1" dirty="0">
+                <a:latin typeface="Century Schoolbook" panose="02040604050505020304" pitchFamily="18" charset="0"/>
+              </a:rPr>
+              <a:t>original</a:t>
+            </a:r>
+            <a:r>
+              <a:rPr lang="en-GB" sz="2800" dirty="0">
+                <a:latin typeface="Century Schoolbook" panose="02040604050505020304" pitchFamily="18" charset="0"/>
+              </a:rPr>
+              <a:t> and detailed ways</a:t>
             </a:r>
           </a:p>
           <a:p>
@@ -19421,7 +19439,19 @@
               <a:rPr lang="en-GB" sz="2800" dirty="0">
                 <a:latin typeface="Century Schoolbook" panose="02040604050505020304" pitchFamily="18" charset="0"/>
               </a:rPr>
-              <a:t>Choose different drawing tools </a:t>
+              <a:t>Choose different drawing </a:t>
+            </a:r>
+            <a:r>
+              <a:rPr lang="en-GB" sz="2800" b="1" dirty="0">
+                <a:latin typeface="Century Schoolbook" panose="02040604050505020304" pitchFamily="18" charset="0"/>
+              </a:rPr>
+              <a:t>tools</a:t>
+            </a:r>
+            <a:r>
+              <a:rPr lang="en-GB" sz="2800" dirty="0">
+                <a:latin typeface="Century Schoolbook" panose="02040604050505020304" pitchFamily="18" charset="0"/>
+              </a:rPr>
+              <a:t> </a:t>
             </a:r>
             <a:r>
               <a:rPr lang="en-GB" sz="2000" dirty="0">
@@ -19446,7 +19476,19 @@
               <a:rPr lang="en-GB" sz="2800" dirty="0">
                 <a:latin typeface="Century Schoolbook" panose="02040604050505020304" pitchFamily="18" charset="0"/>
               </a:rPr>
-              <a:t>Train the NN for new drawing</a:t>
+              <a:t>Train the </a:t>
+            </a:r>
+            <a:r>
+              <a:rPr lang="en-GB" sz="2800" b="1" dirty="0">
+                <a:latin typeface="Century Schoolbook" panose="02040604050505020304" pitchFamily="18" charset="0"/>
+              </a:rPr>
+              <a:t>NN</a:t>
+            </a:r>
+            <a:r>
+              <a:rPr lang="en-GB" sz="2800" dirty="0">
+                <a:latin typeface="Century Schoolbook" panose="02040604050505020304" pitchFamily="18" charset="0"/>
+              </a:rPr>
+              <a:t> for new drawing</a:t>
             </a:r>
           </a:p>
           <a:p>
@@ -19462,7 +19504,19 @@
               <a:rPr lang="en-GB" sz="2800" dirty="0">
                 <a:latin typeface="Century Schoolbook" panose="02040604050505020304" pitchFamily="18" charset="0"/>
               </a:rPr>
-              <a:t>Improve the current NN model </a:t>
+              <a:t>Improve the current NN </a:t>
+            </a:r>
+            <a:r>
+              <a:rPr lang="en-GB" sz="2800" b="1" dirty="0">
+                <a:latin typeface="Century Schoolbook" panose="02040604050505020304" pitchFamily="18" charset="0"/>
+              </a:rPr>
+              <a:t>model</a:t>
+            </a:r>
+            <a:r>
+              <a:rPr lang="en-GB" sz="2800" dirty="0">
+                <a:latin typeface="Century Schoolbook" panose="02040604050505020304" pitchFamily="18" charset="0"/>
+              </a:rPr>
+              <a:t> </a:t>
             </a:r>
           </a:p>
         </p:txBody>

</xml_diff>